<commit_message>
Presentación proyecto verificación de firmas.
</commit_message>
<xml_diff>
--- a/presentaciones/Verificación de firmas.pptx
+++ b/presentaciones/Verificación de firmas.pptx
@@ -14430,10 +14430,10 @@
       </p:grpSpPr>
       <p:pic>
         <p:nvPicPr>
-          <p:cNvPr id="2" name="Imagen 1">
+          <p:cNvPr id="3" name="Imagen 2">
             <a:extLst>
               <a:ext uri="{FF2B5EF4-FFF2-40B4-BE49-F238E27FC236}">
-                <a16:creationId xmlns:a16="http://schemas.microsoft.com/office/drawing/2014/main" id="{F1D07017-DE01-48DA-B448-AB2D1D45C993}"/>
+                <a16:creationId xmlns:a16="http://schemas.microsoft.com/office/drawing/2014/main" id="{ACE44B80-C91E-476D-8F12-18AD9A43C3D8}"/>
               </a:ext>
             </a:extLst>
           </p:cNvPr>
@@ -14450,14 +14450,49 @@
         </p:blipFill>
         <p:spPr>
           <a:xfrm>
-            <a:off x="2023000" y="893178"/>
-            <a:ext cx="8145999" cy="5071643"/>
+            <a:off x="0" y="1968853"/>
+            <a:ext cx="12180497" cy="2920293"/>
           </a:xfrm>
           <a:prstGeom prst="rect">
             <a:avLst/>
           </a:prstGeom>
         </p:spPr>
       </p:pic>
+      <p:sp>
+        <p:nvSpPr>
+          <p:cNvPr id="4" name="CuadroTexto 3">
+            <a:extLst>
+              <a:ext uri="{FF2B5EF4-FFF2-40B4-BE49-F238E27FC236}">
+                <a16:creationId xmlns:a16="http://schemas.microsoft.com/office/drawing/2014/main" id="{07308542-03B0-4F4A-BC68-3F61475DF4FB}"/>
+              </a:ext>
+            </a:extLst>
+          </p:cNvPr>
+          <p:cNvSpPr txBox="1"/>
+          <p:nvPr/>
+        </p:nvSpPr>
+        <p:spPr>
+          <a:xfrm>
+            <a:off x="4105421" y="829995"/>
+            <a:ext cx="3981157" cy="707886"/>
+          </a:xfrm>
+          <a:prstGeom prst="rect">
+            <a:avLst/>
+          </a:prstGeom>
+          <a:noFill/>
+        </p:spPr>
+        <p:txBody>
+          <a:bodyPr wrap="square" rtlCol="0">
+            <a:spAutoFit/>
+          </a:bodyPr>
+          <a:lstStyle/>
+          <a:p>
+            <a:r>
+              <a:rPr lang="es-CO" sz="4000" dirty="0"/>
+              <a:t>RESULTADOS</a:t>
+            </a:r>
+          </a:p>
+        </p:txBody>
+      </p:sp>
     </p:spTree>
     <p:extLst>
       <p:ext uri="{BB962C8B-B14F-4D97-AF65-F5344CB8AC3E}">

</xml_diff>